<commit_message>
adds figure1 in manuscript
</commit_message>
<xml_diff>
--- a/reports/rmarkdown/manuscript/manuscript.pptx
+++ b/reports/rmarkdown/manuscript/manuscript.pptx
@@ -249,7 +249,7 @@
           <a:p>
             <a:fld id="{1744ECAE-D1DD-994A-84DA-F1286CF5693C}" type="datetimeFigureOut">
               <a:rPr lang="en-US" smtClean="0"/>
-              <a:t>12/10/20</a:t>
+              <a:t>12/16/20</a:t>
             </a:fld>
             <a:endParaRPr lang="en-US"/>
           </a:p>
@@ -419,7 +419,7 @@
           <a:p>
             <a:fld id="{1744ECAE-D1DD-994A-84DA-F1286CF5693C}" type="datetimeFigureOut">
               <a:rPr lang="en-US" smtClean="0"/>
-              <a:t>12/10/20</a:t>
+              <a:t>12/16/20</a:t>
             </a:fld>
             <a:endParaRPr lang="en-US"/>
           </a:p>
@@ -599,7 +599,7 @@
           <a:p>
             <a:fld id="{1744ECAE-D1DD-994A-84DA-F1286CF5693C}" type="datetimeFigureOut">
               <a:rPr lang="en-US" smtClean="0"/>
-              <a:t>12/10/20</a:t>
+              <a:t>12/16/20</a:t>
             </a:fld>
             <a:endParaRPr lang="en-US"/>
           </a:p>
@@ -769,7 +769,7 @@
           <a:p>
             <a:fld id="{1744ECAE-D1DD-994A-84DA-F1286CF5693C}" type="datetimeFigureOut">
               <a:rPr lang="en-US" smtClean="0"/>
-              <a:t>12/10/20</a:t>
+              <a:t>12/16/20</a:t>
             </a:fld>
             <a:endParaRPr lang="en-US"/>
           </a:p>
@@ -1013,7 +1013,7 @@
           <a:p>
             <a:fld id="{1744ECAE-D1DD-994A-84DA-F1286CF5693C}" type="datetimeFigureOut">
               <a:rPr lang="en-US" smtClean="0"/>
-              <a:t>12/10/20</a:t>
+              <a:t>12/16/20</a:t>
             </a:fld>
             <a:endParaRPr lang="en-US"/>
           </a:p>
@@ -1245,7 +1245,7 @@
           <a:p>
             <a:fld id="{1744ECAE-D1DD-994A-84DA-F1286CF5693C}" type="datetimeFigureOut">
               <a:rPr lang="en-US" smtClean="0"/>
-              <a:t>12/10/20</a:t>
+              <a:t>12/16/20</a:t>
             </a:fld>
             <a:endParaRPr lang="en-US"/>
           </a:p>
@@ -1612,7 +1612,7 @@
           <a:p>
             <a:fld id="{1744ECAE-D1DD-994A-84DA-F1286CF5693C}" type="datetimeFigureOut">
               <a:rPr lang="en-US" smtClean="0"/>
-              <a:t>12/10/20</a:t>
+              <a:t>12/16/20</a:t>
             </a:fld>
             <a:endParaRPr lang="en-US"/>
           </a:p>
@@ -1730,7 +1730,7 @@
           <a:p>
             <a:fld id="{1744ECAE-D1DD-994A-84DA-F1286CF5693C}" type="datetimeFigureOut">
               <a:rPr lang="en-US" smtClean="0"/>
-              <a:t>12/10/20</a:t>
+              <a:t>12/16/20</a:t>
             </a:fld>
             <a:endParaRPr lang="en-US"/>
           </a:p>
@@ -1825,7 +1825,7 @@
           <a:p>
             <a:fld id="{1744ECAE-D1DD-994A-84DA-F1286CF5693C}" type="datetimeFigureOut">
               <a:rPr lang="en-US" smtClean="0"/>
-              <a:t>12/10/20</a:t>
+              <a:t>12/16/20</a:t>
             </a:fld>
             <a:endParaRPr lang="en-US"/>
           </a:p>
@@ -2102,7 +2102,7 @@
           <a:p>
             <a:fld id="{1744ECAE-D1DD-994A-84DA-F1286CF5693C}" type="datetimeFigureOut">
               <a:rPr lang="en-US" smtClean="0"/>
-              <a:t>12/10/20</a:t>
+              <a:t>12/16/20</a:t>
             </a:fld>
             <a:endParaRPr lang="en-US"/>
           </a:p>
@@ -2359,7 +2359,7 @@
           <a:p>
             <a:fld id="{1744ECAE-D1DD-994A-84DA-F1286CF5693C}" type="datetimeFigureOut">
               <a:rPr lang="en-US" smtClean="0"/>
-              <a:t>12/10/20</a:t>
+              <a:t>12/16/20</a:t>
             </a:fld>
             <a:endParaRPr lang="en-US"/>
           </a:p>
@@ -2581,7 +2581,7 @@
           <a:p>
             <a:fld id="{1744ECAE-D1DD-994A-84DA-F1286CF5693C}" type="datetimeFigureOut">
               <a:rPr lang="en-US" smtClean="0"/>
-              <a:t>12/10/20</a:t>
+              <a:t>12/16/20</a:t>
             </a:fld>
             <a:endParaRPr lang="en-US"/>
           </a:p>
@@ -3976,7 +3976,7 @@
         </p:nvSpPr>
         <p:spPr>
           <a:xfrm>
-            <a:off x="549310" y="4833171"/>
+            <a:off x="549311" y="5767206"/>
             <a:ext cx="5617883" cy="246221"/>
           </a:xfrm>
           <a:prstGeom prst="rect">
@@ -4150,7 +4150,7 @@
         </p:nvSpPr>
         <p:spPr>
           <a:xfrm>
-            <a:off x="3003351" y="3504588"/>
+            <a:off x="4036851" y="3198856"/>
             <a:ext cx="1133341" cy="400110"/>
           </a:xfrm>
           <a:prstGeom prst="rect">
@@ -4195,7 +4195,7 @@
         </p:nvSpPr>
         <p:spPr>
           <a:xfrm>
-            <a:off x="4895202" y="3597154"/>
+            <a:off x="4047495" y="3810847"/>
             <a:ext cx="1133341" cy="400110"/>
           </a:xfrm>
           <a:prstGeom prst="rect">
@@ -4294,7 +4294,7 @@
         </p:nvSpPr>
         <p:spPr>
           <a:xfrm>
-            <a:off x="907513" y="3404846"/>
+            <a:off x="916619" y="4941400"/>
             <a:ext cx="1380287" cy="707886"/>
           </a:xfrm>
           <a:prstGeom prst="rect">
@@ -4360,41 +4360,6 @@
       </p:sp>
       <p:sp>
         <p:nvSpPr>
-          <p:cNvPr id="64" name="TextBox 63">
-            <a:extLst>
-              <a:ext uri="{FF2B5EF4-FFF2-40B4-BE49-F238E27FC236}">
-                <a16:creationId xmlns:a16="http://schemas.microsoft.com/office/drawing/2014/main" id="{E764840D-F120-8242-9F34-8A3FBFB57492}"/>
-              </a:ext>
-            </a:extLst>
-          </p:cNvPr>
-          <p:cNvSpPr txBox="1"/>
-          <p:nvPr/>
-        </p:nvSpPr>
-        <p:spPr>
-          <a:xfrm>
-            <a:off x="4474320" y="3021695"/>
-            <a:ext cx="258404" cy="276999"/>
-          </a:xfrm>
-          <a:prstGeom prst="rect">
-            <a:avLst/>
-          </a:prstGeom>
-          <a:noFill/>
-        </p:spPr>
-        <p:txBody>
-          <a:bodyPr wrap="none" rtlCol="0">
-            <a:spAutoFit/>
-          </a:bodyPr>
-          <a:lstStyle/>
-          <a:p>
-            <a:r>
-              <a:rPr lang="en-US" sz="1200" b="1" dirty="0"/>
-              <a:t>g</a:t>
-            </a:r>
-          </a:p>
-        </p:txBody>
-      </p:sp>
-      <p:sp>
-        <p:nvSpPr>
           <p:cNvPr id="65" name="TextBox 64">
             <a:extLst>
               <a:ext uri="{FF2B5EF4-FFF2-40B4-BE49-F238E27FC236}">
@@ -4430,10 +4395,10 @@
       </p:sp>
       <p:sp>
         <p:nvSpPr>
-          <p:cNvPr id="67" name="Rectangle 66">
+          <p:cNvPr id="68" name="Rectangle 67">
             <a:extLst>
               <a:ext uri="{FF2B5EF4-FFF2-40B4-BE49-F238E27FC236}">
-                <a16:creationId xmlns:a16="http://schemas.microsoft.com/office/drawing/2014/main" id="{4FEB5D60-7CE3-B14C-B8AF-2800A629CE8E}"/>
+                <a16:creationId xmlns:a16="http://schemas.microsoft.com/office/drawing/2014/main" id="{7147CAA8-3BA0-644E-9CD6-A52DBD673B70}"/>
               </a:ext>
             </a:extLst>
           </p:cNvPr>
@@ -4442,8 +4407,8 @@
         </p:nvSpPr>
         <p:spPr>
           <a:xfrm>
-            <a:off x="739216" y="3212290"/>
-            <a:ext cx="1842321" cy="1213061"/>
+            <a:off x="2828048" y="3594712"/>
+            <a:ext cx="3387737" cy="1213061"/>
           </a:xfrm>
           <a:prstGeom prst="rect">
             <a:avLst/>
@@ -4484,10 +4449,10 @@
       </p:sp>
       <p:sp>
         <p:nvSpPr>
-          <p:cNvPr id="68" name="Rectangle 67">
+          <p:cNvPr id="69" name="Rectangle 68">
             <a:extLst>
               <a:ext uri="{FF2B5EF4-FFF2-40B4-BE49-F238E27FC236}">
-                <a16:creationId xmlns:a16="http://schemas.microsoft.com/office/drawing/2014/main" id="{7147CAA8-3BA0-644E-9CD6-A52DBD673B70}"/>
+                <a16:creationId xmlns:a16="http://schemas.microsoft.com/office/drawing/2014/main" id="{5147D604-6BF7-EC4F-B2EF-26125766FB71}"/>
               </a:ext>
             </a:extLst>
           </p:cNvPr>
@@ -4496,8 +4461,8 @@
         </p:nvSpPr>
         <p:spPr>
           <a:xfrm>
-            <a:off x="2840785" y="3196231"/>
-            <a:ext cx="1558291" cy="1213061"/>
+            <a:off x="2840785" y="3192686"/>
+            <a:ext cx="3387737" cy="1609934"/>
           </a:xfrm>
           <a:prstGeom prst="rect">
             <a:avLst/>
@@ -4536,60 +4501,36 @@
           </a:p>
         </p:txBody>
       </p:sp>
-      <p:sp>
-        <p:nvSpPr>
-          <p:cNvPr id="69" name="Rectangle 68">
+      <p:pic>
+        <p:nvPicPr>
+          <p:cNvPr id="3" name="Picture 2">
             <a:extLst>
               <a:ext uri="{FF2B5EF4-FFF2-40B4-BE49-F238E27FC236}">
-                <a16:creationId xmlns:a16="http://schemas.microsoft.com/office/drawing/2014/main" id="{5147D604-6BF7-EC4F-B2EF-26125766FB71}"/>
+                <a16:creationId xmlns:a16="http://schemas.microsoft.com/office/drawing/2014/main" id="{2ABA5E9C-4647-E048-972E-96121E577660}"/>
               </a:ext>
             </a:extLst>
           </p:cNvPr>
-          <p:cNvSpPr/>
+          <p:cNvPicPr>
+            <a:picLocks noChangeAspect="1"/>
+          </p:cNvPicPr>
           <p:nvPr/>
-        </p:nvSpPr>
-        <p:spPr>
-          <a:xfrm>
-            <a:off x="4804110" y="3196231"/>
-            <a:ext cx="1311603" cy="1213061"/>
+        </p:nvPicPr>
+        <p:blipFill>
+          <a:blip r:embed="rId7"/>
+          <a:stretch>
+            <a:fillRect/>
+          </a:stretch>
+        </p:blipFill>
+        <p:spPr>
+          <a:xfrm>
+            <a:off x="765598" y="3142444"/>
+            <a:ext cx="1678687" cy="1738109"/>
           </a:xfrm>
           <a:prstGeom prst="rect">
             <a:avLst/>
           </a:prstGeom>
-          <a:noFill/>
-          <a:ln>
-            <a:solidFill>
-              <a:schemeClr val="bg1">
-                <a:lumMod val="75000"/>
-              </a:schemeClr>
-            </a:solidFill>
-          </a:ln>
-        </p:spPr>
-        <p:style>
-          <a:lnRef idx="2">
-            <a:schemeClr val="accent1">
-              <a:shade val="50000"/>
-            </a:schemeClr>
-          </a:lnRef>
-          <a:fillRef idx="1">
-            <a:schemeClr val="accent1"/>
-          </a:fillRef>
-          <a:effectRef idx="0">
-            <a:schemeClr val="accent1"/>
-          </a:effectRef>
-          <a:fontRef idx="minor">
-            <a:schemeClr val="lt1"/>
-          </a:fontRef>
-        </p:style>
-        <p:txBody>
-          <a:bodyPr rtlCol="0" anchor="ctr"/>
-          <a:lstStyle/>
-          <a:p>
-            <a:pPr algn="ctr"/>
-            <a:endParaRPr lang="en-US"/>
-          </a:p>
-        </p:txBody>
-      </p:sp>
+        </p:spPr>
+      </p:pic>
     </p:spTree>
     <p:extLst>
       <p:ext uri="{BB962C8B-B14F-4D97-AF65-F5344CB8AC3E}">
@@ -4740,7 +4681,7 @@
         </p:nvSpPr>
         <p:spPr>
           <a:xfrm>
-            <a:off x="916793" y="3255346"/>
+            <a:off x="1159939" y="3224516"/>
             <a:ext cx="511679" cy="215444"/>
           </a:xfrm>
           <a:prstGeom prst="rect">
@@ -4845,7 +4786,7 @@
         </p:nvSpPr>
         <p:spPr>
           <a:xfrm>
-            <a:off x="2495883" y="3234018"/>
+            <a:off x="2761546" y="3235321"/>
             <a:ext cx="715260" cy="215444"/>
           </a:xfrm>
           <a:prstGeom prst="rect">
@@ -4881,9 +4822,9 @@
         <p:grpSpPr>
           <a:xfrm>
             <a:off x="596806" y="3420395"/>
-            <a:ext cx="3160502" cy="1574746"/>
+            <a:ext cx="3160502" cy="1574747"/>
             <a:chOff x="3224277" y="2134443"/>
-            <a:chExt cx="3028162" cy="1644054"/>
+            <a:chExt cx="3028162" cy="1644055"/>
           </a:xfrm>
         </p:grpSpPr>
         <p:pic>
@@ -5020,8 +4961,8 @@
           </p:nvSpPr>
           <p:spPr>
             <a:xfrm>
-              <a:off x="4277312" y="3664914"/>
-              <a:ext cx="229683" cy="113583"/>
+              <a:off x="4277312" y="2251169"/>
+              <a:ext cx="229683" cy="1527329"/>
             </a:xfrm>
             <a:prstGeom prst="rect">
               <a:avLst/>
@@ -7364,7 +7305,7 @@
         </p:blipFill>
         <p:spPr>
           <a:xfrm>
-            <a:off x="3507427" y="913274"/>
+            <a:off x="610453" y="975645"/>
             <a:ext cx="2698044" cy="442370"/>
           </a:xfrm>
           <a:prstGeom prst="rect">
@@ -7421,7 +7362,7 @@
         </p:nvSpPr>
         <p:spPr>
           <a:xfrm>
-            <a:off x="1115341" y="1550538"/>
+            <a:off x="3971854" y="1607464"/>
             <a:ext cx="1788046" cy="400110"/>
           </a:xfrm>
           <a:prstGeom prst="rect">
@@ -7546,7 +7487,7 @@
         </p:nvGrpSpPr>
         <p:grpSpPr>
           <a:xfrm>
-            <a:off x="3228769" y="1885125"/>
+            <a:off x="331795" y="1947496"/>
             <a:ext cx="2976702" cy="796096"/>
             <a:chOff x="152400" y="5484323"/>
             <a:chExt cx="6858000" cy="1834119"/>
@@ -7683,7 +7624,7 @@
         </p:nvSpPr>
         <p:spPr>
           <a:xfrm>
-            <a:off x="717830" y="733006"/>
+            <a:off x="3549505" y="717996"/>
             <a:ext cx="2632745" cy="2368653"/>
           </a:xfrm>
           <a:prstGeom prst="rect">
@@ -7814,7 +7755,7 @@
         </p:blipFill>
         <p:spPr>
           <a:xfrm>
-            <a:off x="3507427" y="1369585"/>
+            <a:off x="610453" y="1431956"/>
             <a:ext cx="2698044" cy="218348"/>
           </a:xfrm>
           <a:prstGeom prst="rect">
@@ -7836,7 +7777,7 @@
         </p:nvSpPr>
         <p:spPr>
           <a:xfrm>
-            <a:off x="4039368" y="660082"/>
+            <a:off x="1142394" y="722453"/>
             <a:ext cx="1788046" cy="246221"/>
           </a:xfrm>
           <a:prstGeom prst="rect">
@@ -7872,7 +7813,7 @@
         </p:nvSpPr>
         <p:spPr>
           <a:xfrm>
-            <a:off x="4043490" y="1582494"/>
+            <a:off x="1062501" y="1634708"/>
             <a:ext cx="1788046" cy="246221"/>
           </a:xfrm>
           <a:prstGeom prst="rect">

</xml_diff>